<commit_message>
updated slides with random seed
</commit_message>
<xml_diff>
--- a/class notes/Python Basics (Practice).pptx
+++ b/class notes/Python Basics (Practice).pptx
@@ -6069,54 +6069,6 @@
           <a:chExt cx="0" cy="0"/>
         </a:xfrm>
       </p:grpSpPr>
-      <p:sp>
-        <p:nvSpPr>
-          <p:cNvPr id="8" name="Title 1"/>
-          <p:cNvSpPr txBox="1">
-            <a:spLocks/>
-          </p:cNvSpPr>
-          <p:nvPr/>
-        </p:nvSpPr>
-        <p:spPr>
-          <a:xfrm>
-            <a:off x="381213" y="6417425"/>
-            <a:ext cx="3745748" cy="686276"/>
-          </a:xfrm>
-          <a:prstGeom prst="rect">
-            <a:avLst/>
-          </a:prstGeom>
-        </p:spPr>
-        <p:txBody>
-          <a:bodyPr vert="horz" lIns="91440" tIns="45720" rIns="91440" bIns="45720" rtlCol="0" anchor="ctr">
-            <a:normAutofit/>
-          </a:bodyPr>
-          <a:lstStyle>
-            <a:lvl1pPr algn="l" defTabSz="914400" rtl="0" eaLnBrk="1" latinLnBrk="0" hangingPunct="1">
-              <a:lnSpc>
-                <a:spcPct val="85000"/>
-              </a:lnSpc>
-              <a:spcBef>
-                <a:spcPct val="0"/>
-              </a:spcBef>
-              <a:buNone/>
-              <a:defRPr sz="5400" kern="1200" spc="-120" baseline="0">
-                <a:solidFill>
-                  <a:schemeClr val="accent1"/>
-                </a:solidFill>
-                <a:latin typeface="+mj-lt"/>
-                <a:ea typeface="+mj-ea"/>
-                <a:cs typeface="+mj-cs"/>
-              </a:defRPr>
-            </a:lvl1pPr>
-          </a:lstStyle>
-          <a:p>
-            <a:r>
-              <a:rPr lang="en-US" sz="1600" dirty="0"/>
-              <a:t>Peters, 2004</a:t>
-            </a:r>
-          </a:p>
-        </p:txBody>
-      </p:sp>
       <p:pic>
         <p:nvPicPr>
           <p:cNvPr id="2" name="Picture 1">
@@ -7206,60 +7158,12 @@
           <a:chExt cx="0" cy="0"/>
         </a:xfrm>
       </p:grpSpPr>
-      <p:sp>
-        <p:nvSpPr>
-          <p:cNvPr id="8" name="Title 1"/>
-          <p:cNvSpPr txBox="1">
-            <a:spLocks/>
-          </p:cNvSpPr>
-          <p:nvPr/>
-        </p:nvSpPr>
-        <p:spPr>
-          <a:xfrm>
-            <a:off x="381213" y="6417425"/>
-            <a:ext cx="3745748" cy="686276"/>
-          </a:xfrm>
-          <a:prstGeom prst="rect">
-            <a:avLst/>
-          </a:prstGeom>
-        </p:spPr>
-        <p:txBody>
-          <a:bodyPr vert="horz" lIns="91440" tIns="45720" rIns="91440" bIns="45720" rtlCol="0" anchor="ctr">
-            <a:normAutofit/>
-          </a:bodyPr>
-          <a:lstStyle>
-            <a:lvl1pPr algn="l" defTabSz="914400" rtl="0" eaLnBrk="1" latinLnBrk="0" hangingPunct="1">
-              <a:lnSpc>
-                <a:spcPct val="85000"/>
-              </a:lnSpc>
-              <a:spcBef>
-                <a:spcPct val="0"/>
-              </a:spcBef>
-              <a:buNone/>
-              <a:defRPr sz="5400" kern="1200" spc="-120" baseline="0">
-                <a:solidFill>
-                  <a:schemeClr val="accent1"/>
-                </a:solidFill>
-                <a:latin typeface="+mj-lt"/>
-                <a:ea typeface="+mj-ea"/>
-                <a:cs typeface="+mj-cs"/>
-              </a:defRPr>
-            </a:lvl1pPr>
-          </a:lstStyle>
-          <a:p>
-            <a:r>
-              <a:rPr lang="en-US" sz="1600" dirty="0"/>
-              <a:t>Peters, 2004</a:t>
-            </a:r>
-          </a:p>
-        </p:txBody>
-      </p:sp>
       <p:pic>
         <p:nvPicPr>
-          <p:cNvPr id="3" name="Picture 2">
+          <p:cNvPr id="2" name="Picture 1">
             <a:extLst>
               <a:ext uri="{FF2B5EF4-FFF2-40B4-BE49-F238E27FC236}">
-                <a16:creationId xmlns:a16="http://schemas.microsoft.com/office/drawing/2014/main" id="{ACA431AC-3589-4C0A-8EC7-1ED92ED69FE1}"/>
+                <a16:creationId xmlns:a16="http://schemas.microsoft.com/office/drawing/2014/main" id="{2DF76A97-6364-4F38-9254-738559592188}"/>
               </a:ext>
             </a:extLst>
           </p:cNvPr>
@@ -7276,8 +7180,8 @@
         </p:blipFill>
         <p:spPr>
           <a:xfrm>
-            <a:off x="381213" y="878559"/>
-            <a:ext cx="11439634" cy="5100881"/>
+            <a:off x="381213" y="1228418"/>
+            <a:ext cx="10288436" cy="4401164"/>
           </a:xfrm>
           <a:prstGeom prst="rect">
             <a:avLst/>
@@ -7314,54 +7218,6 @@
           <a:chExt cx="0" cy="0"/>
         </a:xfrm>
       </p:grpSpPr>
-      <p:sp>
-        <p:nvSpPr>
-          <p:cNvPr id="8" name="Title 1"/>
-          <p:cNvSpPr txBox="1">
-            <a:spLocks/>
-          </p:cNvSpPr>
-          <p:nvPr/>
-        </p:nvSpPr>
-        <p:spPr>
-          <a:xfrm>
-            <a:off x="381213" y="6417425"/>
-            <a:ext cx="3745748" cy="686276"/>
-          </a:xfrm>
-          <a:prstGeom prst="rect">
-            <a:avLst/>
-          </a:prstGeom>
-        </p:spPr>
-        <p:txBody>
-          <a:bodyPr vert="horz" lIns="91440" tIns="45720" rIns="91440" bIns="45720" rtlCol="0" anchor="ctr">
-            <a:normAutofit/>
-          </a:bodyPr>
-          <a:lstStyle>
-            <a:lvl1pPr algn="l" defTabSz="914400" rtl="0" eaLnBrk="1" latinLnBrk="0" hangingPunct="1">
-              <a:lnSpc>
-                <a:spcPct val="85000"/>
-              </a:lnSpc>
-              <a:spcBef>
-                <a:spcPct val="0"/>
-              </a:spcBef>
-              <a:buNone/>
-              <a:defRPr sz="5400" kern="1200" spc="-120" baseline="0">
-                <a:solidFill>
-                  <a:schemeClr val="accent1"/>
-                </a:solidFill>
-                <a:latin typeface="+mj-lt"/>
-                <a:ea typeface="+mj-ea"/>
-                <a:cs typeface="+mj-cs"/>
-              </a:defRPr>
-            </a:lvl1pPr>
-          </a:lstStyle>
-          <a:p>
-            <a:r>
-              <a:rPr lang="en-US" sz="1600" dirty="0"/>
-              <a:t>Peters, 2004</a:t>
-            </a:r>
-          </a:p>
-        </p:txBody>
-      </p:sp>
       <p:pic>
         <p:nvPicPr>
           <p:cNvPr id="11" name="Picture 10">
@@ -7422,54 +7278,6 @@
           <a:chExt cx="0" cy="0"/>
         </a:xfrm>
       </p:grpSpPr>
-      <p:sp>
-        <p:nvSpPr>
-          <p:cNvPr id="8" name="Title 1"/>
-          <p:cNvSpPr txBox="1">
-            <a:spLocks/>
-          </p:cNvSpPr>
-          <p:nvPr/>
-        </p:nvSpPr>
-        <p:spPr>
-          <a:xfrm>
-            <a:off x="381213" y="6417425"/>
-            <a:ext cx="3745748" cy="686276"/>
-          </a:xfrm>
-          <a:prstGeom prst="rect">
-            <a:avLst/>
-          </a:prstGeom>
-        </p:spPr>
-        <p:txBody>
-          <a:bodyPr vert="horz" lIns="91440" tIns="45720" rIns="91440" bIns="45720" rtlCol="0" anchor="ctr">
-            <a:normAutofit/>
-          </a:bodyPr>
-          <a:lstStyle>
-            <a:lvl1pPr algn="l" defTabSz="914400" rtl="0" eaLnBrk="1" latinLnBrk="0" hangingPunct="1">
-              <a:lnSpc>
-                <a:spcPct val="85000"/>
-              </a:lnSpc>
-              <a:spcBef>
-                <a:spcPct val="0"/>
-              </a:spcBef>
-              <a:buNone/>
-              <a:defRPr sz="5400" kern="1200" spc="-120" baseline="0">
-                <a:solidFill>
-                  <a:schemeClr val="accent1"/>
-                </a:solidFill>
-                <a:latin typeface="+mj-lt"/>
-                <a:ea typeface="+mj-ea"/>
-                <a:cs typeface="+mj-cs"/>
-              </a:defRPr>
-            </a:lvl1pPr>
-          </a:lstStyle>
-          <a:p>
-            <a:r>
-              <a:rPr lang="en-US" sz="1600" dirty="0"/>
-              <a:t>Peters, 2004</a:t>
-            </a:r>
-          </a:p>
-        </p:txBody>
-      </p:sp>
       <p:pic>
         <p:nvPicPr>
           <p:cNvPr id="2" name="Picture 1">

</xml_diff>